<commit_message>
Examples for 1027 recitation
</commit_message>
<xml_diff>
--- a/Slides/1021Recitation.pptx
+++ b/Slides/1021Recitation.pptx
@@ -3818,7 +3818,7 @@
           <a:p>
             <a:fld id="{4B2C3995-10D3-7249-9CF2-C18001382AD9}" type="datetimeFigureOut">
               <a:rPr lang="en-US" smtClean="0"/>
-              <a:t>10/20/21</a:t>
+              <a:t>10/21/21</a:t>
             </a:fld>
             <a:endParaRPr lang="en-US"/>
           </a:p>
@@ -5111,7 +5111,7 @@
           <a:p>
             <a:fld id="{4AAD347D-5ACD-4C99-B74B-A9C85AD731AF}" type="datetimeFigureOut">
               <a:rPr lang="en-US" dirty="0"/>
-              <a:t>10/20/21</a:t>
+              <a:t>10/21/21</a:t>
             </a:fld>
             <a:endParaRPr lang="en-US" dirty="0"/>
           </a:p>
@@ -5381,7 +5381,7 @@
           <a:p>
             <a:fld id="{4509A250-FF31-4206-8172-F9D3106AACB1}" type="datetimeFigureOut">
               <a:rPr lang="en-US" dirty="0"/>
-              <a:t>10/20/21</a:t>
+              <a:t>10/21/21</a:t>
             </a:fld>
             <a:endParaRPr lang="en-US" dirty="0"/>
           </a:p>
@@ -5570,7 +5570,7 @@
           <a:p>
             <a:fld id="{4509A250-FF31-4206-8172-F9D3106AACB1}" type="datetimeFigureOut">
               <a:rPr lang="en-US" dirty="0"/>
-              <a:t>10/20/21</a:t>
+              <a:t>10/21/21</a:t>
             </a:fld>
             <a:endParaRPr lang="en-US" dirty="0"/>
           </a:p>
@@ -5838,7 +5838,7 @@
           <a:p>
             <a:fld id="{4509A250-FF31-4206-8172-F9D3106AACB1}" type="datetimeFigureOut">
               <a:rPr lang="en-US" dirty="0"/>
-              <a:t>10/20/21</a:t>
+              <a:t>10/21/21</a:t>
             </a:fld>
             <a:endParaRPr lang="en-US" dirty="0"/>
           </a:p>
@@ -6174,7 +6174,7 @@
           <a:p>
             <a:fld id="{4509A250-FF31-4206-8172-F9D3106AACB1}" type="datetimeFigureOut">
               <a:rPr lang="en-US" dirty="0"/>
-              <a:t>10/20/21</a:t>
+              <a:t>10/21/21</a:t>
             </a:fld>
             <a:endParaRPr lang="en-US" dirty="0"/>
           </a:p>
@@ -6792,7 +6792,7 @@
           <a:p>
             <a:fld id="{4509A250-FF31-4206-8172-F9D3106AACB1}" type="datetimeFigureOut">
               <a:rPr lang="en-US" dirty="0"/>
-              <a:t>10/20/21</a:t>
+              <a:t>10/21/21</a:t>
             </a:fld>
             <a:endParaRPr lang="en-US" dirty="0"/>
           </a:p>
@@ -7647,7 +7647,7 @@
           <a:p>
             <a:fld id="{4509A250-FF31-4206-8172-F9D3106AACB1}" type="datetimeFigureOut">
               <a:rPr lang="en-US" dirty="0"/>
-              <a:t>10/20/21</a:t>
+              <a:t>10/21/21</a:t>
             </a:fld>
             <a:endParaRPr lang="en-US" dirty="0"/>
           </a:p>
@@ -7812,7 +7812,7 @@
           <a:p>
             <a:fld id="{4509A250-FF31-4206-8172-F9D3106AACB1}" type="datetimeFigureOut">
               <a:rPr lang="en-US" dirty="0"/>
-              <a:t>10/20/21</a:t>
+              <a:t>10/21/21</a:t>
             </a:fld>
             <a:endParaRPr lang="en-US" dirty="0"/>
           </a:p>
@@ -7987,7 +7987,7 @@
           <a:p>
             <a:fld id="{4509A250-FF31-4206-8172-F9D3106AACB1}" type="datetimeFigureOut">
               <a:rPr lang="en-US" dirty="0"/>
-              <a:t>10/20/21</a:t>
+              <a:t>10/21/21</a:t>
             </a:fld>
             <a:endParaRPr lang="en-US" dirty="0"/>
           </a:p>
@@ -8152,7 +8152,7 @@
           <a:p>
             <a:fld id="{4509A250-FF31-4206-8172-F9D3106AACB1}" type="datetimeFigureOut">
               <a:rPr lang="en-US" dirty="0"/>
-              <a:t>10/20/21</a:t>
+              <a:t>10/21/21</a:t>
             </a:fld>
             <a:endParaRPr lang="en-US" dirty="0"/>
           </a:p>
@@ -8394,7 +8394,7 @@
           <a:p>
             <a:fld id="{9796027F-7875-4030-9381-8BD8C4F21935}" type="datetimeFigureOut">
               <a:rPr lang="en-US" dirty="0"/>
-              <a:t>10/20/21</a:t>
+              <a:t>10/21/21</a:t>
             </a:fld>
             <a:endParaRPr lang="en-US" dirty="0"/>
           </a:p>
@@ -8681,7 +8681,7 @@
           <a:p>
             <a:fld id="{9796027F-7875-4030-9381-8BD8C4F21935}" type="datetimeFigureOut">
               <a:rPr lang="en-US" dirty="0"/>
-              <a:t>10/20/21</a:t>
+              <a:t>10/21/21</a:t>
             </a:fld>
             <a:endParaRPr lang="en-US" dirty="0"/>
           </a:p>
@@ -9120,7 +9120,7 @@
           <a:p>
             <a:fld id="{9796027F-7875-4030-9381-8BD8C4F21935}" type="datetimeFigureOut">
               <a:rPr lang="en-US" dirty="0"/>
-              <a:t>10/20/21</a:t>
+              <a:t>10/21/21</a:t>
             </a:fld>
             <a:endParaRPr lang="en-US" dirty="0"/>
           </a:p>
@@ -9233,7 +9233,7 @@
           <a:p>
             <a:fld id="{4509A250-FF31-4206-8172-F9D3106AACB1}" type="datetimeFigureOut">
               <a:rPr lang="en-US" dirty="0"/>
-              <a:t>10/20/21</a:t>
+              <a:t>10/21/21</a:t>
             </a:fld>
             <a:endParaRPr lang="en-US" dirty="0"/>
           </a:p>
@@ -9323,7 +9323,7 @@
           <a:p>
             <a:fld id="{4509A250-FF31-4206-8172-F9D3106AACB1}" type="datetimeFigureOut">
               <a:rPr lang="en-US" dirty="0"/>
-              <a:t>10/20/21</a:t>
+              <a:t>10/21/21</a:t>
             </a:fld>
             <a:endParaRPr lang="en-US" dirty="0"/>
           </a:p>
@@ -9597,7 +9597,7 @@
           <a:p>
             <a:fld id="{4509A250-FF31-4206-8172-F9D3106AACB1}" type="datetimeFigureOut">
               <a:rPr lang="en-US" dirty="0"/>
-              <a:t>10/20/21</a:t>
+              <a:t>10/21/21</a:t>
             </a:fld>
             <a:endParaRPr lang="en-US" dirty="0"/>
           </a:p>
@@ -9867,7 +9867,7 @@
           <a:p>
             <a:fld id="{4509A250-FF31-4206-8172-F9D3106AACB1}" type="datetimeFigureOut">
               <a:rPr lang="en-US" dirty="0"/>
-              <a:t>10/20/21</a:t>
+              <a:t>10/21/21</a:t>
             </a:fld>
             <a:endParaRPr lang="en-US" dirty="0"/>
           </a:p>
@@ -10291,7 +10291,7 @@
           <a:p>
             <a:fld id="{4AAD347D-5ACD-4C99-B74B-A9C85AD731AF}" type="datetimeFigureOut">
               <a:rPr lang="en-US" dirty="0"/>
-              <a:t>10/20/21</a:t>
+              <a:t>10/21/21</a:t>
             </a:fld>
             <a:endParaRPr lang="en-US" dirty="0"/>
           </a:p>
@@ -10885,6 +10885,38 @@
           </a:p>
         </p:txBody>
       </p:sp>
+      <p:sp>
+        <p:nvSpPr>
+          <p:cNvPr id="4" name="TextBox 3">
+            <a:extLst>
+              <a:ext uri="{FF2B5EF4-FFF2-40B4-BE49-F238E27FC236}">
+                <a16:creationId xmlns:a16="http://schemas.microsoft.com/office/drawing/2014/main" id="{7B516FC0-5485-5A43-B456-54F4DB5840D3}"/>
+              </a:ext>
+            </a:extLst>
+          </p:cNvPr>
+          <p:cNvSpPr txBox="1"/>
+          <p:nvPr/>
+        </p:nvSpPr>
+        <p:spPr>
+          <a:xfrm>
+            <a:off x="2431473" y="2026227"/>
+            <a:ext cx="184731" cy="369332"/>
+          </a:xfrm>
+          <a:prstGeom prst="rect">
+            <a:avLst/>
+          </a:prstGeom>
+          <a:noFill/>
+        </p:spPr>
+        <p:txBody>
+          <a:bodyPr wrap="none" rtlCol="0">
+            <a:spAutoFit/>
+          </a:bodyPr>
+          <a:lstStyle/>
+          <a:p>
+            <a:endParaRPr lang="en-US" dirty="0"/>
+          </a:p>
+        </p:txBody>
+      </p:sp>
     </p:spTree>
     <p:extLst>
       <p:ext uri="{BB962C8B-B14F-4D97-AF65-F5344CB8AC3E}">
@@ -19044,8 +19076,8 @@
           </a:prstGeom>
         </p:spPr>
       </p:pic>
-      <mc:AlternateContent xmlns:mc="http://schemas.openxmlformats.org/markup-compatibility/2006">
-        <mc:Choice xmlns:p14="http://schemas.microsoft.com/office/powerpoint/2010/main" Requires="p14">
+      <mc:AlternateContent xmlns:mc="http://schemas.openxmlformats.org/markup-compatibility/2006" xmlns:p14="http://schemas.microsoft.com/office/powerpoint/2010/main">
+        <mc:Choice Requires="p14">
           <p:contentPart p14:bwMode="auto" r:id="rId4">
             <p14:nvContentPartPr>
               <p14:cNvPr id="8" name="Ink 7">
@@ -19064,7 +19096,7 @@
             </p14:xfrm>
           </p:contentPart>
         </mc:Choice>
-        <mc:Fallback>
+        <mc:Fallback xmlns="">
           <p:pic>
             <p:nvPicPr>
               <p:cNvPr id="8" name="Ink 7">
@@ -19095,8 +19127,8 @@
           </p:pic>
         </mc:Fallback>
       </mc:AlternateContent>
-      <mc:AlternateContent xmlns:mc="http://schemas.openxmlformats.org/markup-compatibility/2006">
-        <mc:Choice xmlns:p14="http://schemas.microsoft.com/office/powerpoint/2010/main" Requires="p14">
+      <mc:AlternateContent xmlns:mc="http://schemas.openxmlformats.org/markup-compatibility/2006" xmlns:p14="http://schemas.microsoft.com/office/powerpoint/2010/main">
+        <mc:Choice Requires="p14">
           <p:contentPart p14:bwMode="auto" r:id="rId6">
             <p14:nvContentPartPr>
               <p14:cNvPr id="9" name="Ink 8">
@@ -19115,7 +19147,7 @@
             </p14:xfrm>
           </p:contentPart>
         </mc:Choice>
-        <mc:Fallback>
+        <mc:Fallback xmlns="">
           <p:pic>
             <p:nvPicPr>
               <p:cNvPr id="9" name="Ink 8">
@@ -19146,8 +19178,8 @@
           </p:pic>
         </mc:Fallback>
       </mc:AlternateContent>
-      <mc:AlternateContent xmlns:mc="http://schemas.openxmlformats.org/markup-compatibility/2006">
-        <mc:Choice xmlns:p14="http://schemas.microsoft.com/office/powerpoint/2010/main" Requires="p14">
+      <mc:AlternateContent xmlns:mc="http://schemas.openxmlformats.org/markup-compatibility/2006" xmlns:p14="http://schemas.microsoft.com/office/powerpoint/2010/main">
+        <mc:Choice Requires="p14">
           <p:contentPart p14:bwMode="auto" r:id="rId8">
             <p14:nvContentPartPr>
               <p14:cNvPr id="10" name="Ink 9">
@@ -19166,7 +19198,7 @@
             </p14:xfrm>
           </p:contentPart>
         </mc:Choice>
-        <mc:Fallback>
+        <mc:Fallback xmlns="">
           <p:pic>
             <p:nvPicPr>
               <p:cNvPr id="10" name="Ink 9">
@@ -19357,8 +19389,8 @@
           </a:prstGeom>
         </p:spPr>
       </p:pic>
-      <mc:AlternateContent xmlns:mc="http://schemas.openxmlformats.org/markup-compatibility/2006">
-        <mc:Choice xmlns:p14="http://schemas.microsoft.com/office/powerpoint/2010/main" Requires="p14">
+      <mc:AlternateContent xmlns:mc="http://schemas.openxmlformats.org/markup-compatibility/2006" xmlns:p14="http://schemas.microsoft.com/office/powerpoint/2010/main">
+        <mc:Choice Requires="p14">
           <p:contentPart p14:bwMode="auto" r:id="rId3">
             <p14:nvContentPartPr>
               <p14:cNvPr id="8" name="Ink 7">
@@ -19377,7 +19409,7 @@
             </p14:xfrm>
           </p:contentPart>
         </mc:Choice>
-        <mc:Fallback>
+        <mc:Fallback xmlns="">
           <p:pic>
             <p:nvPicPr>
               <p:cNvPr id="8" name="Ink 7">
@@ -19408,8 +19440,8 @@
           </p:pic>
         </mc:Fallback>
       </mc:AlternateContent>
-      <mc:AlternateContent xmlns:mc="http://schemas.openxmlformats.org/markup-compatibility/2006">
-        <mc:Choice xmlns:p14="http://schemas.microsoft.com/office/powerpoint/2010/main" Requires="p14">
+      <mc:AlternateContent xmlns:mc="http://schemas.openxmlformats.org/markup-compatibility/2006" xmlns:p14="http://schemas.microsoft.com/office/powerpoint/2010/main">
+        <mc:Choice Requires="p14">
           <p:contentPart p14:bwMode="auto" r:id="rId5">
             <p14:nvContentPartPr>
               <p14:cNvPr id="9" name="Ink 8">
@@ -19428,7 +19460,7 @@
             </p14:xfrm>
           </p:contentPart>
         </mc:Choice>
-        <mc:Fallback>
+        <mc:Fallback xmlns="">
           <p:pic>
             <p:nvPicPr>
               <p:cNvPr id="9" name="Ink 8">
@@ -24385,8 +24417,8 @@
           <a:effectLst/>
         </p:spPr>
       </p:pic>
-      <mc:AlternateContent xmlns:mc="http://schemas.openxmlformats.org/markup-compatibility/2006">
-        <mc:Choice xmlns:p14="http://schemas.microsoft.com/office/powerpoint/2010/main" Requires="p14">
+      <mc:AlternateContent xmlns:mc="http://schemas.openxmlformats.org/markup-compatibility/2006" xmlns:p14="http://schemas.microsoft.com/office/powerpoint/2010/main">
+        <mc:Choice Requires="p14">
           <p:contentPart p14:bwMode="auto" r:id="rId4">
             <p14:nvContentPartPr>
               <p14:cNvPr id="4" name="Ink 3">
@@ -24405,7 +24437,7 @@
             </p14:xfrm>
           </p:contentPart>
         </mc:Choice>
-        <mc:Fallback>
+        <mc:Fallback xmlns="">
           <p:pic>
             <p:nvPicPr>
               <p:cNvPr id="4" name="Ink 3">
@@ -24436,8 +24468,8 @@
           </p:pic>
         </mc:Fallback>
       </mc:AlternateContent>
-      <mc:AlternateContent xmlns:mc="http://schemas.openxmlformats.org/markup-compatibility/2006">
-        <mc:Choice xmlns:p14="http://schemas.microsoft.com/office/powerpoint/2010/main" Requires="p14">
+      <mc:AlternateContent xmlns:mc="http://schemas.openxmlformats.org/markup-compatibility/2006" xmlns:p14="http://schemas.microsoft.com/office/powerpoint/2010/main">
+        <mc:Choice Requires="p14">
           <p:contentPart p14:bwMode="auto" r:id="rId6">
             <p14:nvContentPartPr>
               <p14:cNvPr id="13" name="Ink 12">
@@ -24456,7 +24488,7 @@
             </p14:xfrm>
           </p:contentPart>
         </mc:Choice>
-        <mc:Fallback>
+        <mc:Fallback xmlns="">
           <p:pic>
             <p:nvPicPr>
               <p:cNvPr id="13" name="Ink 12">
@@ -24487,8 +24519,8 @@
           </p:pic>
         </mc:Fallback>
       </mc:AlternateContent>
-      <mc:AlternateContent xmlns:mc="http://schemas.openxmlformats.org/markup-compatibility/2006">
-        <mc:Choice xmlns:p14="http://schemas.microsoft.com/office/powerpoint/2010/main" Requires="p14">
+      <mc:AlternateContent xmlns:mc="http://schemas.openxmlformats.org/markup-compatibility/2006" xmlns:p14="http://schemas.microsoft.com/office/powerpoint/2010/main">
+        <mc:Choice Requires="p14">
           <p:contentPart p14:bwMode="auto" r:id="rId8">
             <p14:nvContentPartPr>
               <p14:cNvPr id="15" name="Ink 14">
@@ -24507,7 +24539,7 @@
             </p14:xfrm>
           </p:contentPart>
         </mc:Choice>
-        <mc:Fallback>
+        <mc:Fallback xmlns="">
           <p:pic>
             <p:nvPicPr>
               <p:cNvPr id="15" name="Ink 14">
@@ -24538,8 +24570,8 @@
           </p:pic>
         </mc:Fallback>
       </mc:AlternateContent>
-      <mc:AlternateContent xmlns:mc="http://schemas.openxmlformats.org/markup-compatibility/2006">
-        <mc:Choice xmlns:p14="http://schemas.microsoft.com/office/powerpoint/2010/main" Requires="p14">
+      <mc:AlternateContent xmlns:mc="http://schemas.openxmlformats.org/markup-compatibility/2006" xmlns:p14="http://schemas.microsoft.com/office/powerpoint/2010/main">
+        <mc:Choice Requires="p14">
           <p:contentPart p14:bwMode="auto" r:id="rId10">
             <p14:nvContentPartPr>
               <p14:cNvPr id="17" name="Ink 16">
@@ -24558,7 +24590,7 @@
             </p14:xfrm>
           </p:contentPart>
         </mc:Choice>
-        <mc:Fallback>
+        <mc:Fallback xmlns="">
           <p:pic>
             <p:nvPicPr>
               <p:cNvPr id="17" name="Ink 16">
@@ -24609,8 +24641,8 @@
             <a:chExt cx="3867840" cy="1219680"/>
           </a:xfrm>
         </p:grpSpPr>
-        <mc:AlternateContent xmlns:mc="http://schemas.openxmlformats.org/markup-compatibility/2006">
-          <mc:Choice xmlns:p14="http://schemas.microsoft.com/office/powerpoint/2010/main" Requires="p14">
+        <mc:AlternateContent xmlns:mc="http://schemas.openxmlformats.org/markup-compatibility/2006" xmlns:p14="http://schemas.microsoft.com/office/powerpoint/2010/main">
+          <mc:Choice Requires="p14">
             <p:contentPart p14:bwMode="auto" r:id="rId12">
               <p14:nvContentPartPr>
                 <p14:cNvPr id="6" name="Ink 5">
@@ -24629,7 +24661,7 @@
               </p14:xfrm>
             </p:contentPart>
           </mc:Choice>
-          <mc:Fallback>
+          <mc:Fallback xmlns="">
             <p:pic>
               <p:nvPicPr>
                 <p:cNvPr id="6" name="Ink 5">
@@ -24660,8 +24692,8 @@
             </p:pic>
           </mc:Fallback>
         </mc:AlternateContent>
-        <mc:AlternateContent xmlns:mc="http://schemas.openxmlformats.org/markup-compatibility/2006">
-          <mc:Choice xmlns:p14="http://schemas.microsoft.com/office/powerpoint/2010/main" Requires="p14">
+        <mc:AlternateContent xmlns:mc="http://schemas.openxmlformats.org/markup-compatibility/2006" xmlns:p14="http://schemas.microsoft.com/office/powerpoint/2010/main">
+          <mc:Choice Requires="p14">
             <p:contentPart p14:bwMode="auto" r:id="rId14">
               <p14:nvContentPartPr>
                 <p14:cNvPr id="7" name="Ink 6">
@@ -24680,7 +24712,7 @@
               </p14:xfrm>
             </p:contentPart>
           </mc:Choice>
-          <mc:Fallback>
+          <mc:Fallback xmlns="">
             <p:pic>
               <p:nvPicPr>
                 <p:cNvPr id="7" name="Ink 6">
@@ -24711,8 +24743,8 @@
             </p:pic>
           </mc:Fallback>
         </mc:AlternateContent>
-        <mc:AlternateContent xmlns:mc="http://schemas.openxmlformats.org/markup-compatibility/2006">
-          <mc:Choice xmlns:p14="http://schemas.microsoft.com/office/powerpoint/2010/main" Requires="p14">
+        <mc:AlternateContent xmlns:mc="http://schemas.openxmlformats.org/markup-compatibility/2006" xmlns:p14="http://schemas.microsoft.com/office/powerpoint/2010/main">
+          <mc:Choice Requires="p14">
             <p:contentPart p14:bwMode="auto" r:id="rId16">
               <p14:nvContentPartPr>
                 <p14:cNvPr id="9" name="Ink 8">
@@ -24731,7 +24763,7 @@
               </p14:xfrm>
             </p:contentPart>
           </mc:Choice>
-          <mc:Fallback>
+          <mc:Fallback xmlns="">
             <p:pic>
               <p:nvPicPr>
                 <p:cNvPr id="9" name="Ink 8">
@@ -24762,8 +24794,8 @@
             </p:pic>
           </mc:Fallback>
         </mc:AlternateContent>
-        <mc:AlternateContent xmlns:mc="http://schemas.openxmlformats.org/markup-compatibility/2006">
-          <mc:Choice xmlns:p14="http://schemas.microsoft.com/office/powerpoint/2010/main" Requires="p14">
+        <mc:AlternateContent xmlns:mc="http://schemas.openxmlformats.org/markup-compatibility/2006" xmlns:p14="http://schemas.microsoft.com/office/powerpoint/2010/main">
+          <mc:Choice Requires="p14">
             <p:contentPart p14:bwMode="auto" r:id="rId18">
               <p14:nvContentPartPr>
                 <p14:cNvPr id="11" name="Ink 10">
@@ -24782,7 +24814,7 @@
               </p14:xfrm>
             </p:contentPart>
           </mc:Choice>
-          <mc:Fallback>
+          <mc:Fallback xmlns="">
             <p:pic>
               <p:nvPicPr>
                 <p:cNvPr id="11" name="Ink 10">
@@ -24813,8 +24845,8 @@
             </p:pic>
           </mc:Fallback>
         </mc:AlternateContent>
-        <mc:AlternateContent xmlns:mc="http://schemas.openxmlformats.org/markup-compatibility/2006">
-          <mc:Choice xmlns:p14="http://schemas.microsoft.com/office/powerpoint/2010/main" Requires="p14">
+        <mc:AlternateContent xmlns:mc="http://schemas.openxmlformats.org/markup-compatibility/2006" xmlns:p14="http://schemas.microsoft.com/office/powerpoint/2010/main">
+          <mc:Choice Requires="p14">
             <p:contentPart p14:bwMode="auto" r:id="rId20">
               <p14:nvContentPartPr>
                 <p14:cNvPr id="22" name="Ink 21">
@@ -24833,7 +24865,7 @@
               </p14:xfrm>
             </p:contentPart>
           </mc:Choice>
-          <mc:Fallback>
+          <mc:Fallback xmlns="">
             <p:pic>
               <p:nvPicPr>
                 <p:cNvPr id="22" name="Ink 21">
@@ -32336,8 +32368,8 @@
           <a:effectLst/>
         </p:spPr>
       </p:pic>
-      <mc:AlternateContent xmlns:mc="http://schemas.openxmlformats.org/markup-compatibility/2006">
-        <mc:Choice xmlns:p14="http://schemas.microsoft.com/office/powerpoint/2010/main" Requires="p14">
+      <mc:AlternateContent xmlns:mc="http://schemas.openxmlformats.org/markup-compatibility/2006" xmlns:p14="http://schemas.microsoft.com/office/powerpoint/2010/main">
+        <mc:Choice Requires="p14">
           <p:contentPart p14:bwMode="auto" r:id="rId4">
             <p14:nvContentPartPr>
               <p14:cNvPr id="17" name="Ink 16">
@@ -32356,7 +32388,7 @@
             </p14:xfrm>
           </p:contentPart>
         </mc:Choice>
-        <mc:Fallback>
+        <mc:Fallback xmlns="">
           <p:pic>
             <p:nvPicPr>
               <p:cNvPr id="17" name="Ink 16">
@@ -32387,8 +32419,8 @@
           </p:pic>
         </mc:Fallback>
       </mc:AlternateContent>
-      <mc:AlternateContent xmlns:mc="http://schemas.openxmlformats.org/markup-compatibility/2006">
-        <mc:Choice xmlns:p14="http://schemas.microsoft.com/office/powerpoint/2010/main" Requires="p14">
+      <mc:AlternateContent xmlns:mc="http://schemas.openxmlformats.org/markup-compatibility/2006" xmlns:p14="http://schemas.microsoft.com/office/powerpoint/2010/main">
+        <mc:Choice Requires="p14">
           <p:contentPart p14:bwMode="auto" r:id="rId6">
             <p14:nvContentPartPr>
               <p14:cNvPr id="22" name="Ink 21">
@@ -32407,7 +32439,7 @@
             </p14:xfrm>
           </p:contentPart>
         </mc:Choice>
-        <mc:Fallback>
+        <mc:Fallback xmlns="">
           <p:pic>
             <p:nvPicPr>
               <p:cNvPr id="22" name="Ink 21">
@@ -32438,8 +32470,8 @@
           </p:pic>
         </mc:Fallback>
       </mc:AlternateContent>
-      <mc:AlternateContent xmlns:mc="http://schemas.openxmlformats.org/markup-compatibility/2006">
-        <mc:Choice xmlns:p14="http://schemas.microsoft.com/office/powerpoint/2010/main" Requires="p14">
+      <mc:AlternateContent xmlns:mc="http://schemas.openxmlformats.org/markup-compatibility/2006" xmlns:p14="http://schemas.microsoft.com/office/powerpoint/2010/main">
+        <mc:Choice Requires="p14">
           <p:contentPart p14:bwMode="auto" r:id="rId8">
             <p14:nvContentPartPr>
               <p14:cNvPr id="23" name="Ink 22">
@@ -32458,7 +32490,7 @@
             </p14:xfrm>
           </p:contentPart>
         </mc:Choice>
-        <mc:Fallback>
+        <mc:Fallback xmlns="">
           <p:pic>
             <p:nvPicPr>
               <p:cNvPr id="23" name="Ink 22">
@@ -32489,8 +32521,8 @@
           </p:pic>
         </mc:Fallback>
       </mc:AlternateContent>
-      <mc:AlternateContent xmlns:mc="http://schemas.openxmlformats.org/markup-compatibility/2006">
-        <mc:Choice xmlns:p14="http://schemas.microsoft.com/office/powerpoint/2010/main" Requires="p14">
+      <mc:AlternateContent xmlns:mc="http://schemas.openxmlformats.org/markup-compatibility/2006" xmlns:p14="http://schemas.microsoft.com/office/powerpoint/2010/main">
+        <mc:Choice Requires="p14">
           <p:contentPart p14:bwMode="auto" r:id="rId10">
             <p14:nvContentPartPr>
               <p14:cNvPr id="30" name="Ink 29">
@@ -32509,7 +32541,7 @@
             </p14:xfrm>
           </p:contentPart>
         </mc:Choice>
-        <mc:Fallback>
+        <mc:Fallback xmlns="">
           <p:pic>
             <p:nvPicPr>
               <p:cNvPr id="30" name="Ink 29">
@@ -32540,8 +32572,8 @@
           </p:pic>
         </mc:Fallback>
       </mc:AlternateContent>
-      <mc:AlternateContent xmlns:mc="http://schemas.openxmlformats.org/markup-compatibility/2006">
-        <mc:Choice xmlns:p14="http://schemas.microsoft.com/office/powerpoint/2010/main" Requires="p14">
+      <mc:AlternateContent xmlns:mc="http://schemas.openxmlformats.org/markup-compatibility/2006" xmlns:p14="http://schemas.microsoft.com/office/powerpoint/2010/main">
+        <mc:Choice Requires="p14">
           <p:contentPart p14:bwMode="auto" r:id="rId12">
             <p14:nvContentPartPr>
               <p14:cNvPr id="31" name="Ink 30">
@@ -32560,7 +32592,7 @@
             </p14:xfrm>
           </p:contentPart>
         </mc:Choice>
-        <mc:Fallback>
+        <mc:Fallback xmlns="">
           <p:pic>
             <p:nvPicPr>
               <p:cNvPr id="31" name="Ink 30">
@@ -32591,8 +32623,8 @@
           </p:pic>
         </mc:Fallback>
       </mc:AlternateContent>
-      <mc:AlternateContent xmlns:mc="http://schemas.openxmlformats.org/markup-compatibility/2006">
-        <mc:Choice xmlns:p14="http://schemas.microsoft.com/office/powerpoint/2010/main" Requires="p14">
+      <mc:AlternateContent xmlns:mc="http://schemas.openxmlformats.org/markup-compatibility/2006" xmlns:p14="http://schemas.microsoft.com/office/powerpoint/2010/main">
+        <mc:Choice Requires="p14">
           <p:contentPart p14:bwMode="auto" r:id="rId14">
             <p14:nvContentPartPr>
               <p14:cNvPr id="32" name="Ink 31">
@@ -32611,7 +32643,7 @@
             </p14:xfrm>
           </p:contentPart>
         </mc:Choice>
-        <mc:Fallback>
+        <mc:Fallback xmlns="">
           <p:pic>
             <p:nvPicPr>
               <p:cNvPr id="32" name="Ink 31">
@@ -32642,8 +32674,8 @@
           </p:pic>
         </mc:Fallback>
       </mc:AlternateContent>
-      <mc:AlternateContent xmlns:mc="http://schemas.openxmlformats.org/markup-compatibility/2006">
-        <mc:Choice xmlns:p14="http://schemas.microsoft.com/office/powerpoint/2010/main" Requires="p14">
+      <mc:AlternateContent xmlns:mc="http://schemas.openxmlformats.org/markup-compatibility/2006" xmlns:p14="http://schemas.microsoft.com/office/powerpoint/2010/main">
+        <mc:Choice Requires="p14">
           <p:contentPart p14:bwMode="auto" r:id="rId16">
             <p14:nvContentPartPr>
               <p14:cNvPr id="33" name="Ink 32">
@@ -32662,7 +32694,7 @@
             </p14:xfrm>
           </p:contentPart>
         </mc:Choice>
-        <mc:Fallback>
+        <mc:Fallback xmlns="">
           <p:pic>
             <p:nvPicPr>
               <p:cNvPr id="33" name="Ink 32">
@@ -32693,8 +32725,8 @@
           </p:pic>
         </mc:Fallback>
       </mc:AlternateContent>
-      <mc:AlternateContent xmlns:mc="http://schemas.openxmlformats.org/markup-compatibility/2006">
-        <mc:Choice xmlns:p14="http://schemas.microsoft.com/office/powerpoint/2010/main" Requires="p14">
+      <mc:AlternateContent xmlns:mc="http://schemas.openxmlformats.org/markup-compatibility/2006" xmlns:p14="http://schemas.microsoft.com/office/powerpoint/2010/main">
+        <mc:Choice Requires="p14">
           <p:contentPart p14:bwMode="auto" r:id="rId18">
             <p14:nvContentPartPr>
               <p14:cNvPr id="34" name="Ink 33">
@@ -32713,7 +32745,7 @@
             </p14:xfrm>
           </p:contentPart>
         </mc:Choice>
-        <mc:Fallback>
+        <mc:Fallback xmlns="">
           <p:pic>
             <p:nvPicPr>
               <p:cNvPr id="34" name="Ink 33">
@@ -35902,8 +35934,8 @@
           </a:p>
         </p:txBody>
       </p:sp>
-      <mc:AlternateContent xmlns:mc="http://schemas.openxmlformats.org/markup-compatibility/2006">
-        <mc:Choice xmlns:p14="http://schemas.microsoft.com/office/powerpoint/2010/main" Requires="p14">
+      <mc:AlternateContent xmlns:mc="http://schemas.openxmlformats.org/markup-compatibility/2006" xmlns:p14="http://schemas.microsoft.com/office/powerpoint/2010/main">
+        <mc:Choice Requires="p14">
           <p:contentPart p14:bwMode="auto" r:id="rId4">
             <p14:nvContentPartPr>
               <p14:cNvPr id="4" name="Ink 3">
@@ -35922,7 +35954,7 @@
             </p14:xfrm>
           </p:contentPart>
         </mc:Choice>
-        <mc:Fallback>
+        <mc:Fallback xmlns="">
           <p:pic>
             <p:nvPicPr>
               <p:cNvPr id="4" name="Ink 3">
@@ -35953,8 +35985,8 @@
           </p:pic>
         </mc:Fallback>
       </mc:AlternateContent>
-      <mc:AlternateContent xmlns:mc="http://schemas.openxmlformats.org/markup-compatibility/2006">
-        <mc:Choice xmlns:p14="http://schemas.microsoft.com/office/powerpoint/2010/main" Requires="p14">
+      <mc:AlternateContent xmlns:mc="http://schemas.openxmlformats.org/markup-compatibility/2006" xmlns:p14="http://schemas.microsoft.com/office/powerpoint/2010/main">
+        <mc:Choice Requires="p14">
           <p:contentPart p14:bwMode="auto" r:id="rId6">
             <p14:nvContentPartPr>
               <p14:cNvPr id="7" name="Ink 6">
@@ -35973,7 +36005,7 @@
             </p14:xfrm>
           </p:contentPart>
         </mc:Choice>
-        <mc:Fallback>
+        <mc:Fallback xmlns="">
           <p:pic>
             <p:nvPicPr>
               <p:cNvPr id="7" name="Ink 6">
@@ -36004,8 +36036,8 @@
           </p:pic>
         </mc:Fallback>
       </mc:AlternateContent>
-      <mc:AlternateContent xmlns:mc="http://schemas.openxmlformats.org/markup-compatibility/2006">
-        <mc:Choice xmlns:p14="http://schemas.microsoft.com/office/powerpoint/2010/main" Requires="p14">
+      <mc:AlternateContent xmlns:mc="http://schemas.openxmlformats.org/markup-compatibility/2006" xmlns:p14="http://schemas.microsoft.com/office/powerpoint/2010/main">
+        <mc:Choice Requires="p14">
           <p:contentPart p14:bwMode="auto" r:id="rId8">
             <p14:nvContentPartPr>
               <p14:cNvPr id="8" name="Ink 7">
@@ -36024,7 +36056,7 @@
             </p14:xfrm>
           </p:contentPart>
         </mc:Choice>
-        <mc:Fallback>
+        <mc:Fallback xmlns="">
           <p:pic>
             <p:nvPicPr>
               <p:cNvPr id="8" name="Ink 7">
@@ -36075,8 +36107,8 @@
             <a:chExt cx="371880" cy="860400"/>
           </a:xfrm>
         </p:grpSpPr>
-        <mc:AlternateContent xmlns:mc="http://schemas.openxmlformats.org/markup-compatibility/2006">
-          <mc:Choice xmlns:p14="http://schemas.microsoft.com/office/powerpoint/2010/main" Requires="p14">
+        <mc:AlternateContent xmlns:mc="http://schemas.openxmlformats.org/markup-compatibility/2006" xmlns:p14="http://schemas.microsoft.com/office/powerpoint/2010/main">
+          <mc:Choice Requires="p14">
             <p:contentPart p14:bwMode="auto" r:id="rId10">
               <p14:nvContentPartPr>
                 <p14:cNvPr id="12" name="Ink 11">
@@ -36095,7 +36127,7 @@
               </p14:xfrm>
             </p:contentPart>
           </mc:Choice>
-          <mc:Fallback>
+          <mc:Fallback xmlns="">
             <p:pic>
               <p:nvPicPr>
                 <p:cNvPr id="12" name="Ink 11">
@@ -36126,8 +36158,8 @@
             </p:pic>
           </mc:Fallback>
         </mc:AlternateContent>
-        <mc:AlternateContent xmlns:mc="http://schemas.openxmlformats.org/markup-compatibility/2006">
-          <mc:Choice xmlns:p14="http://schemas.microsoft.com/office/powerpoint/2010/main" Requires="p14">
+        <mc:AlternateContent xmlns:mc="http://schemas.openxmlformats.org/markup-compatibility/2006" xmlns:p14="http://schemas.microsoft.com/office/powerpoint/2010/main">
+          <mc:Choice Requires="p14">
             <p:contentPart p14:bwMode="auto" r:id="rId12">
               <p14:nvContentPartPr>
                 <p14:cNvPr id="13" name="Ink 12">
@@ -36146,7 +36178,7 @@
               </p14:xfrm>
             </p:contentPart>
           </mc:Choice>
-          <mc:Fallback>
+          <mc:Fallback xmlns="">
             <p:pic>
               <p:nvPicPr>
                 <p:cNvPr id="13" name="Ink 12">
@@ -36177,8 +36209,8 @@
             </p:pic>
           </mc:Fallback>
         </mc:AlternateContent>
-        <mc:AlternateContent xmlns:mc="http://schemas.openxmlformats.org/markup-compatibility/2006">
-          <mc:Choice xmlns:p14="http://schemas.microsoft.com/office/powerpoint/2010/main" Requires="p14">
+        <mc:AlternateContent xmlns:mc="http://schemas.openxmlformats.org/markup-compatibility/2006" xmlns:p14="http://schemas.microsoft.com/office/powerpoint/2010/main">
+          <mc:Choice Requires="p14">
             <p:contentPart p14:bwMode="auto" r:id="rId14">
               <p14:nvContentPartPr>
                 <p14:cNvPr id="14" name="Ink 13">
@@ -36197,7 +36229,7 @@
               </p14:xfrm>
             </p:contentPart>
           </mc:Choice>
-          <mc:Fallback>
+          <mc:Fallback xmlns="">
             <p:pic>
               <p:nvPicPr>
                 <p:cNvPr id="14" name="Ink 13">
@@ -36228,8 +36260,8 @@
             </p:pic>
           </mc:Fallback>
         </mc:AlternateContent>
-        <mc:AlternateContent xmlns:mc="http://schemas.openxmlformats.org/markup-compatibility/2006">
-          <mc:Choice xmlns:p14="http://schemas.microsoft.com/office/powerpoint/2010/main" Requires="p14">
+        <mc:AlternateContent xmlns:mc="http://schemas.openxmlformats.org/markup-compatibility/2006" xmlns:p14="http://schemas.microsoft.com/office/powerpoint/2010/main">
+          <mc:Choice Requires="p14">
             <p:contentPart p14:bwMode="auto" r:id="rId16">
               <p14:nvContentPartPr>
                 <p14:cNvPr id="16" name="Ink 15">
@@ -36248,7 +36280,7 @@
               </p14:xfrm>
             </p:contentPart>
           </mc:Choice>
-          <mc:Fallback>
+          <mc:Fallback xmlns="">
             <p:pic>
               <p:nvPicPr>
                 <p:cNvPr id="16" name="Ink 15">
@@ -36279,8 +36311,8 @@
             </p:pic>
           </mc:Fallback>
         </mc:AlternateContent>
-        <mc:AlternateContent xmlns:mc="http://schemas.openxmlformats.org/markup-compatibility/2006">
-          <mc:Choice xmlns:p14="http://schemas.microsoft.com/office/powerpoint/2010/main" Requires="p14">
+        <mc:AlternateContent xmlns:mc="http://schemas.openxmlformats.org/markup-compatibility/2006" xmlns:p14="http://schemas.microsoft.com/office/powerpoint/2010/main">
+          <mc:Choice Requires="p14">
             <p:contentPart p14:bwMode="auto" r:id="rId18">
               <p14:nvContentPartPr>
                 <p14:cNvPr id="17" name="Ink 16">
@@ -36299,7 +36331,7 @@
               </p14:xfrm>
             </p:contentPart>
           </mc:Choice>
-          <mc:Fallback>
+          <mc:Fallback xmlns="">
             <p:pic>
               <p:nvPicPr>
                 <p:cNvPr id="17" name="Ink 16">

</xml_diff>